<commit_message>
Update title page assets with new PowerPoint template and PDF version
</commit_message>
<xml_diff>
--- a/assets/title-page/tp-template.pptx
+++ b/assets/title-page/tp-template.pptx
@@ -224,7 +224,7 @@
           <a:p>
             <a:fld id="{AF6480D5-27DF-C14F-81D5-C764716120D4}" type="datetimeFigureOut">
               <a:rPr lang="ru-RU" smtClean="0"/>
-              <a:t>17.11.2024</a:t>
+              <a:t>19.11.2025</a:t>
             </a:fld>
             <a:endParaRPr lang="ru-RU"/>
           </a:p>
@@ -402,7 +402,7 @@
           <a:p>
             <a:fld id="{FCFB0163-A91E-EB42-B12D-04EDD0499C0D}" type="datetimeFigureOut">
               <a:rPr lang="ru-RU" smtClean="0"/>
-              <a:t>17.11.2024</a:t>
+              <a:t>19.11.2025</a:t>
             </a:fld>
             <a:endParaRPr lang="ru-RU"/>
           </a:p>
@@ -801,7 +801,7 @@
           <a:p>
             <a:fld id="{C764DE79-268F-4C1A-8933-263129D2AF90}" type="datetimeFigureOut">
               <a:rPr lang="en-US" dirty="0"/>
-              <a:t>11/17/24</a:t>
+              <a:t>11/19/25</a:t>
             </a:fld>
             <a:endParaRPr lang="en-US" dirty="0"/>
           </a:p>
@@ -971,7 +971,7 @@
           <a:p>
             <a:fld id="{89E6D65E-222F-4FAD-BCDE-05C720C90B92}" type="datetimeFigureOut">
               <a:rPr lang="ru-RU" smtClean="0"/>
-              <a:t>17.11.2024</a:t>
+              <a:t>19.11.2025</a:t>
             </a:fld>
             <a:endParaRPr lang="ru-RU"/>
           </a:p>
@@ -1151,7 +1151,7 @@
           <a:p>
             <a:fld id="{89E6D65E-222F-4FAD-BCDE-05C720C90B92}" type="datetimeFigureOut">
               <a:rPr lang="ru-RU" smtClean="0"/>
-              <a:t>17.11.2024</a:t>
+              <a:t>19.11.2025</a:t>
             </a:fld>
             <a:endParaRPr lang="ru-RU"/>
           </a:p>
@@ -1444,7 +1444,7 @@
           <a:p>
             <a:fld id="{89E6D65E-222F-4FAD-BCDE-05C720C90B92}" type="datetimeFigureOut">
               <a:rPr lang="ru-RU" smtClean="0"/>
-              <a:t>17.11.2024</a:t>
+              <a:t>19.11.2025</a:t>
             </a:fld>
             <a:endParaRPr lang="ru-RU"/>
           </a:p>
@@ -1688,7 +1688,7 @@
           <a:p>
             <a:fld id="{89E6D65E-222F-4FAD-BCDE-05C720C90B92}" type="datetimeFigureOut">
               <a:rPr lang="ru-RU" smtClean="0"/>
-              <a:t>17.11.2024</a:t>
+              <a:t>19.11.2025</a:t>
             </a:fld>
             <a:endParaRPr lang="ru-RU"/>
           </a:p>
@@ -1920,7 +1920,7 @@
           <a:p>
             <a:fld id="{89E6D65E-222F-4FAD-BCDE-05C720C90B92}" type="datetimeFigureOut">
               <a:rPr lang="ru-RU" smtClean="0"/>
-              <a:t>17.11.2024</a:t>
+              <a:t>19.11.2025</a:t>
             </a:fld>
             <a:endParaRPr lang="ru-RU"/>
           </a:p>
@@ -2287,7 +2287,7 @@
           <a:p>
             <a:fld id="{89E6D65E-222F-4FAD-BCDE-05C720C90B92}" type="datetimeFigureOut">
               <a:rPr lang="ru-RU" smtClean="0"/>
-              <a:t>17.11.2024</a:t>
+              <a:t>19.11.2025</a:t>
             </a:fld>
             <a:endParaRPr lang="ru-RU"/>
           </a:p>
@@ -2405,7 +2405,7 @@
           <a:p>
             <a:fld id="{89E6D65E-222F-4FAD-BCDE-05C720C90B92}" type="datetimeFigureOut">
               <a:rPr lang="ru-RU" smtClean="0"/>
-              <a:t>17.11.2024</a:t>
+              <a:t>19.11.2025</a:t>
             </a:fld>
             <a:endParaRPr lang="ru-RU"/>
           </a:p>
@@ -2500,7 +2500,7 @@
           <a:p>
             <a:fld id="{89E6D65E-222F-4FAD-BCDE-05C720C90B92}" type="datetimeFigureOut">
               <a:rPr lang="ru-RU" smtClean="0"/>
-              <a:t>17.11.2024</a:t>
+              <a:t>19.11.2025</a:t>
             </a:fld>
             <a:endParaRPr lang="ru-RU"/>
           </a:p>
@@ -2777,7 +2777,7 @@
           <a:p>
             <a:fld id="{89E6D65E-222F-4FAD-BCDE-05C720C90B92}" type="datetimeFigureOut">
               <a:rPr lang="ru-RU" smtClean="0"/>
-              <a:t>17.11.2024</a:t>
+              <a:t>19.11.2025</a:t>
             </a:fld>
             <a:endParaRPr lang="ru-RU"/>
           </a:p>
@@ -3034,7 +3034,7 @@
           <a:p>
             <a:fld id="{89E6D65E-222F-4FAD-BCDE-05C720C90B92}" type="datetimeFigureOut">
               <a:rPr lang="ru-RU" smtClean="0"/>
-              <a:t>17.11.2024</a:t>
+              <a:t>19.11.2025</a:t>
             </a:fld>
             <a:endParaRPr lang="ru-RU"/>
           </a:p>
@@ -3247,7 +3247,7 @@
           <a:p>
             <a:fld id="{89E6D65E-222F-4FAD-BCDE-05C720C90B92}" type="datetimeFigureOut">
               <a:rPr lang="ru-RU" smtClean="0"/>
-              <a:t>17.11.2024</a:t>
+              <a:t>19.11.2025</a:t>
             </a:fld>
             <a:endParaRPr lang="ru-RU"/>
           </a:p>
@@ -3908,8 +3908,23 @@
                 </a:solidFill>
                 <a:latin typeface="Ubuntu Light" panose="020B0304030602030204" pitchFamily="34" charset="0"/>
               </a:rPr>
-              <a:t>2024</a:t>
-            </a:r>
+              <a:t>202</a:t>
+            </a:r>
+            <a:r>
+              <a:rPr lang="en-US" sz="2000" dirty="0">
+                <a:solidFill>
+                  <a:srgbClr val="292929"/>
+                </a:solidFill>
+                <a:latin typeface="Ubuntu Light" panose="020B0304030602030204" pitchFamily="34" charset="0"/>
+              </a:rPr>
+              <a:t>5</a:t>
+            </a:r>
+            <a:endParaRPr lang="ru-RU" sz="2000" dirty="0">
+              <a:solidFill>
+                <a:srgbClr val="292929"/>
+              </a:solidFill>
+              <a:latin typeface="Ubuntu Light" panose="020B0304030602030204" pitchFamily="34" charset="0"/>
+            </a:endParaRPr>
           </a:p>
         </p:txBody>
       </p:sp>
@@ -4238,8 +4253,23 @@
                 </a:solidFill>
                 <a:latin typeface="Ubuntu Light" panose="020B0304030602030204" pitchFamily="34" charset="0"/>
               </a:rPr>
-              <a:t>2024</a:t>
-            </a:r>
+              <a:t>202</a:t>
+            </a:r>
+            <a:r>
+              <a:rPr lang="en-US" sz="2000">
+                <a:solidFill>
+                  <a:srgbClr val="E5E2DE"/>
+                </a:solidFill>
+                <a:latin typeface="Ubuntu Light" panose="020B0304030602030204" pitchFamily="34" charset="0"/>
+              </a:rPr>
+              <a:t>5</a:t>
+            </a:r>
+            <a:endParaRPr lang="ru-RU" sz="2000" dirty="0">
+              <a:solidFill>
+                <a:srgbClr val="E5E2DE"/>
+              </a:solidFill>
+              <a:latin typeface="Ubuntu Light" panose="020B0304030602030204" pitchFamily="34" charset="0"/>
+            </a:endParaRPr>
           </a:p>
         </p:txBody>
       </p:sp>

</xml_diff>